<commit_message>
fix slide animations - animations -> animation pane -> view master nesto -> remove Number or smth like that
</commit_message>
<xml_diff>
--- a/PrezentacijaProjekata.pptx
+++ b/PrezentacijaProjekata.pptx
@@ -662,7 +662,7 @@
           <a:p>
             <a:fld id="{96DFF08F-DC6B-4601-B491-B0F83F6DD2DA}" type="datetimeFigureOut">
               <a:rPr lang="en-US" smtClean="0"/>
-              <a:t>1/25/2016</a:t>
+              <a:t>25-Jan-16</a:t>
             </a:fld>
             <a:endParaRPr lang="en-US" dirty="0"/>
           </a:p>
@@ -7849,91 +7849,9 @@
   <p:timing>
     <p:tnLst>
       <p:par>
-        <p:cTn id="1" dur="indefinite" restart="never" nodeType="tmRoot">
-          <p:childTnLst>
-            <p:seq concurrent="1" nextAc="seek">
-              <p:cTn id="2" dur="indefinite" nodeType="mainSeq">
-                <p:childTnLst>
-                  <p:par>
-                    <p:cTn id="3" fill="hold">
-                      <p:stCondLst>
-                        <p:cond delay="indefinite"/>
-                        <p:cond evt="onBegin" delay="0">
-                          <p:tn val="2"/>
-                        </p:cond>
-                      </p:stCondLst>
-                      <p:childTnLst>
-                        <p:par>
-                          <p:cTn id="4" fill="hold">
-                            <p:stCondLst>
-                              <p:cond delay="0"/>
-                            </p:stCondLst>
-                            <p:childTnLst>
-                              <p:par>
-                                <p:cTn id="5" presetID="16" presetClass="entr" presetSubtype="26" fill="hold" grpId="0" nodeType="withEffect">
-                                  <p:stCondLst>
-                                    <p:cond delay="5000"/>
-                                  </p:stCondLst>
-                                  <p:childTnLst>
-                                    <p:set>
-                                      <p:cBhvr>
-                                        <p:cTn id="6" dur="1" fill="hold">
-                                          <p:stCondLst>
-                                            <p:cond delay="0"/>
-                                          </p:stCondLst>
-                                        </p:cTn>
-                                        <p:tgtEl>
-                                          <p:spTgt spid="6"/>
-                                        </p:tgtEl>
-                                        <p:attrNameLst>
-                                          <p:attrName>style.visibility</p:attrName>
-                                        </p:attrNameLst>
-                                      </p:cBhvr>
-                                      <p:to>
-                                        <p:strVal val="visible"/>
-                                      </p:to>
-                                    </p:set>
-                                    <p:animEffect transition="in" filter="barn(inHorizontal)">
-                                      <p:cBhvr>
-                                        <p:cTn id="7" dur="500"/>
-                                        <p:tgtEl>
-                                          <p:spTgt spid="6"/>
-                                        </p:tgtEl>
-                                      </p:cBhvr>
-                                    </p:animEffect>
-                                  </p:childTnLst>
-                                </p:cTn>
-                              </p:par>
-                            </p:childTnLst>
-                          </p:cTn>
-                        </p:par>
-                      </p:childTnLst>
-                    </p:cTn>
-                  </p:par>
-                </p:childTnLst>
-              </p:cTn>
-              <p:prevCondLst>
-                <p:cond evt="onPrev" delay="0">
-                  <p:tgtEl>
-                    <p:sldTgt/>
-                  </p:tgtEl>
-                </p:cond>
-              </p:prevCondLst>
-              <p:nextCondLst>
-                <p:cond evt="onNext" delay="0">
-                  <p:tgtEl>
-                    <p:sldTgt/>
-                  </p:tgtEl>
-                </p:cond>
-              </p:nextCondLst>
-            </p:seq>
-          </p:childTnLst>
-        </p:cTn>
+        <p:cTn id="1" dur="indefinite" restart="never" nodeType="tmRoot"/>
       </p:par>
     </p:tnLst>
-    <p:bldLst>
-      <p:bldP spid="6" grpId="0"/>
-    </p:bldLst>
   </p:timing>
   <p:hf hdr="0" ftr="0" dt="0"/>
   <p:txStyles>
@@ -8683,7 +8601,7 @@
               <a:rPr lang="hr-HR" smtClean="0"/>
               <a:t>2</a:t>
             </a:fld>
-            <a:endParaRPr lang="hr-HR"/>
+            <a:endParaRPr lang="hr-HR" dirty="0"/>
           </a:p>
         </p:txBody>
       </p:sp>
@@ -8766,7 +8684,6 @@
               <a:rPr lang="hr-HR" dirty="0" smtClean="0"/>
               <a:t>Ideja projekta je mogućnost naručivanja jela na internetu, bez potrebe telefonskog poziva</a:t>
             </a:r>
-            <a:endParaRPr lang="hr-HR" dirty="0" smtClean="0"/>
           </a:p>
           <a:p>
             <a:r>
@@ -8914,15 +8831,7 @@
             </a:pPr>
             <a:r>
               <a:rPr lang="hr-HR" b="1" dirty="0" smtClean="0"/>
-              <a:t>		Lista </a:t>
-            </a:r>
-            <a:r>
-              <a:rPr lang="hr-HR" b="1" dirty="0" smtClean="0"/>
-              <a:t>glavnih funkcionalnih </a:t>
-            </a:r>
-            <a:r>
-              <a:rPr lang="hr-HR" b="1" dirty="0" smtClean="0"/>
-              <a:t>zahtjeva</a:t>
+              <a:t>		Lista glavnih funkcionalnih zahtjeva</a:t>
             </a:r>
           </a:p>
           <a:p>
@@ -8964,7 +8873,6 @@
               <a:rPr lang="hr-HR" dirty="0" smtClean="0"/>
               <a:t>Može potvrđivati i odbijati narudžbe</a:t>
             </a:r>
-            <a:endParaRPr lang="hr-HR" dirty="0" smtClean="0"/>
           </a:p>
           <a:p>
             <a:pPr lvl="1"/>
@@ -9292,7 +9200,6 @@
               <a:rPr lang="hr-HR" dirty="0" smtClean="0"/>
               <a:t>Microsoft Word 2013</a:t>
             </a:r>
-            <a:endParaRPr lang="hr-HR" dirty="0" smtClean="0"/>
           </a:p>
           <a:p>
             <a:pPr marL="457200" lvl="1" indent="0">
@@ -9310,15 +9217,7 @@
             </a:r>
             <a:r>
               <a:rPr lang="hr-HR" b="1" dirty="0" smtClean="0"/>
-              <a:t>Korišteni </a:t>
-            </a:r>
-            <a:r>
-              <a:rPr lang="hr-HR" b="1" dirty="0" smtClean="0"/>
-              <a:t>programski jezici i </a:t>
-            </a:r>
-            <a:r>
-              <a:rPr lang="hr-HR" b="1" dirty="0" smtClean="0"/>
-              <a:t>tehnologije</a:t>
+              <a:t>Korišteni programski jezici i tehnologije</a:t>
             </a:r>
           </a:p>
           <a:p>
@@ -9489,7 +9388,6 @@
               <a:rPr lang="hr-HR" dirty="0" smtClean="0"/>
               <a:t>narudžbama</a:t>
             </a:r>
-            <a:endParaRPr lang="hr-HR" dirty="0" smtClean="0"/>
           </a:p>
         </p:txBody>
       </p:sp>

</xml_diff>